<commit_message>
Deploying to gh-pages from @ YoungJIn94/YoungJIn94.github.io@df88544e48d309ac18580f4b423fdce2e2404727 🚀
</commit_message>
<xml_diff>
--- a/assets/img/publication_preview/FoldedCamera.pptx
+++ b/assets/img/publication_preview/FoldedCamera.pptx
@@ -3778,6 +3778,170 @@
           </p:style>
         </p:cxnSp>
       </p:grpSp>
+      <p:grpSp>
+        <p:nvGrpSpPr>
+          <p:cNvPr id="22" name="그룹 21">
+            <a:extLst>
+              <a:ext uri="{FF2B5EF4-FFF2-40B4-BE49-F238E27FC236}">
+                <a16:creationId xmlns:a16="http://schemas.microsoft.com/office/drawing/2014/main" id="{37361E21-C288-4CB7-B878-72A2A8F9FAEC}"/>
+              </a:ext>
+            </a:extLst>
+          </p:cNvPr>
+          <p:cNvGrpSpPr/>
+          <p:nvPr/>
+        </p:nvGrpSpPr>
+        <p:grpSpPr>
+          <a:xfrm rot="10800000" flipH="1">
+            <a:off x="1290830" y="3494673"/>
+            <a:ext cx="465841" cy="501825"/>
+            <a:chOff x="1365250" y="1206500"/>
+            <a:chExt cx="406791" cy="158750"/>
+          </a:xfrm>
+        </p:grpSpPr>
+        <p:cxnSp>
+          <p:nvCxnSpPr>
+            <p:cNvPr id="23" name="직선 연결선 22">
+              <a:extLst>
+                <a:ext uri="{FF2B5EF4-FFF2-40B4-BE49-F238E27FC236}">
+                  <a16:creationId xmlns:a16="http://schemas.microsoft.com/office/drawing/2014/main" id="{47334D3B-C36A-40C5-B0CE-D24089ACDA0C}"/>
+                </a:ext>
+              </a:extLst>
+            </p:cNvPr>
+            <p:cNvCxnSpPr>
+              <a:cxnSpLocks/>
+            </p:cNvCxnSpPr>
+            <p:nvPr/>
+          </p:nvCxnSpPr>
+          <p:spPr>
+            <a:xfrm flipV="1">
+              <a:off x="1365250" y="1206500"/>
+              <a:ext cx="190500" cy="158750"/>
+            </a:xfrm>
+            <a:prstGeom prst="line">
+              <a:avLst/>
+            </a:prstGeom>
+            <a:ln w="19050">
+              <a:solidFill>
+                <a:schemeClr val="tx1"/>
+              </a:solidFill>
+            </a:ln>
+          </p:spPr>
+          <p:style>
+            <a:lnRef idx="1">
+              <a:schemeClr val="accent1"/>
+            </a:lnRef>
+            <a:fillRef idx="0">
+              <a:schemeClr val="accent1"/>
+            </a:fillRef>
+            <a:effectRef idx="0">
+              <a:schemeClr val="accent1"/>
+            </a:effectRef>
+            <a:fontRef idx="minor">
+              <a:schemeClr val="tx1"/>
+            </a:fontRef>
+          </p:style>
+        </p:cxnSp>
+        <p:cxnSp>
+          <p:nvCxnSpPr>
+            <p:cNvPr id="24" name="직선 연결선 23">
+              <a:extLst>
+                <a:ext uri="{FF2B5EF4-FFF2-40B4-BE49-F238E27FC236}">
+                  <a16:creationId xmlns:a16="http://schemas.microsoft.com/office/drawing/2014/main" id="{5ECADF09-F404-4563-83EE-62C6DB21EBCA}"/>
+                </a:ext>
+              </a:extLst>
+            </p:cNvPr>
+            <p:cNvCxnSpPr>
+              <a:cxnSpLocks/>
+            </p:cNvCxnSpPr>
+            <p:nvPr/>
+          </p:nvCxnSpPr>
+          <p:spPr>
+            <a:xfrm>
+              <a:off x="1552172" y="1207130"/>
+              <a:ext cx="219869" cy="0"/>
+            </a:xfrm>
+            <a:prstGeom prst="line">
+              <a:avLst/>
+            </a:prstGeom>
+            <a:ln w="19050">
+              <a:solidFill>
+                <a:schemeClr val="tx1"/>
+              </a:solidFill>
+            </a:ln>
+          </p:spPr>
+          <p:style>
+            <a:lnRef idx="1">
+              <a:schemeClr val="accent1"/>
+            </a:lnRef>
+            <a:fillRef idx="0">
+              <a:schemeClr val="accent1"/>
+            </a:fillRef>
+            <a:effectRef idx="0">
+              <a:schemeClr val="accent1"/>
+            </a:effectRef>
+            <a:fontRef idx="minor">
+              <a:schemeClr val="tx1"/>
+            </a:fontRef>
+          </p:style>
+        </p:cxnSp>
+      </p:grpSp>
+      <p:sp>
+        <p:nvSpPr>
+          <p:cNvPr id="25" name="TextBox 24">
+            <a:extLst>
+              <a:ext uri="{FF2B5EF4-FFF2-40B4-BE49-F238E27FC236}">
+                <a16:creationId xmlns:a16="http://schemas.microsoft.com/office/drawing/2014/main" id="{BA3A5FA3-0EED-4BB5-81BE-9066B66CCD2E}"/>
+              </a:ext>
+            </a:extLst>
+          </p:cNvPr>
+          <p:cNvSpPr txBox="1"/>
+          <p:nvPr/>
+        </p:nvSpPr>
+        <p:spPr>
+          <a:xfrm>
+            <a:off x="1676339" y="3668517"/>
+            <a:ext cx="1154543" cy="646331"/>
+          </a:xfrm>
+          <a:prstGeom prst="rect">
+            <a:avLst/>
+          </a:prstGeom>
+          <a:noFill/>
+        </p:spPr>
+        <p:txBody>
+          <a:bodyPr wrap="square" rtlCol="0">
+            <a:spAutoFit/>
+          </a:bodyPr>
+          <a:lstStyle/>
+          <a:p>
+            <a:pPr algn="ctr"/>
+            <a:r>
+              <a:rPr lang="en-US" altLang="ko-KR" sz="1800" b="1" dirty="0">
+                <a:latin typeface="helvetica" panose="020B0604020202020204" pitchFamily="34" charset="0"/>
+                <a:cs typeface="helvetica" panose="020B0604020202020204" pitchFamily="34" charset="0"/>
+              </a:rPr>
+              <a:t>Gold</a:t>
+            </a:r>
+            <a:r>
+              <a:rPr lang="ko-KR" altLang="en-US" sz="1800" b="1" dirty="0">
+                <a:latin typeface="helvetica" panose="020B0604020202020204" pitchFamily="34" charset="0"/>
+                <a:cs typeface="helvetica" panose="020B0604020202020204" pitchFamily="34" charset="0"/>
+              </a:rPr>
+              <a:t> </a:t>
+            </a:r>
+            <a:r>
+              <a:rPr lang="en-US" altLang="ko-KR" sz="1800" b="1" dirty="0">
+                <a:latin typeface="helvetica" panose="020B0604020202020204" pitchFamily="34" charset="0"/>
+                <a:cs typeface="helvetica" panose="020B0604020202020204" pitchFamily="34" charset="0"/>
+              </a:rPr>
+              <a:t>reflector</a:t>
+            </a:r>
+            <a:endParaRPr lang="ko-KR" altLang="en-US" sz="1800" b="1" dirty="0">
+              <a:latin typeface="helvetica" panose="020B0604020202020204" pitchFamily="34" charset="0"/>
+              <a:cs typeface="helvetica" panose="020B0604020202020204" pitchFamily="34" charset="0"/>
+            </a:endParaRPr>
+          </a:p>
+        </p:txBody>
+      </p:sp>
     </p:spTree>
     <p:extLst>
       <p:ext uri="{BB962C8B-B14F-4D97-AF65-F5344CB8AC3E}">

</xml_diff>